<commit_message>
Added yelp and api details to presentaation
</commit_message>
<xml_diff>
--- a/Know Your Brew!.pptx
+++ b/Know Your Brew!.pptx
@@ -12,10 +12,12 @@
     <p:sldId id="267" r:id="rId6"/>
     <p:sldId id="269" r:id="rId7"/>
     <p:sldId id="270" r:id="rId8"/>
-    <p:sldId id="268" r:id="rId9"/>
-    <p:sldId id="258" r:id="rId10"/>
-    <p:sldId id="265" r:id="rId11"/>
-    <p:sldId id="263" r:id="rId12"/>
+    <p:sldId id="272" r:id="rId9"/>
+    <p:sldId id="268" r:id="rId10"/>
+    <p:sldId id="258" r:id="rId11"/>
+    <p:sldId id="271" r:id="rId12"/>
+    <p:sldId id="265" r:id="rId13"/>
+    <p:sldId id="263" r:id="rId14"/>
   </p:sldIdLst>
   <p:sldSz cx="12192000" cy="6858000"/>
   <p:notesSz cx="6858000" cy="9144000"/>
@@ -8130,6 +8132,395 @@
           <p:cNvPr id="2" name="Title 1">
             <a:extLst>
               <a:ext uri="{FF2B5EF4-FFF2-40B4-BE49-F238E27FC236}">
+                <a16:creationId xmlns:a16="http://schemas.microsoft.com/office/drawing/2014/main" id="{A573A4AF-39B5-419F-8AD8-9020C0D68039}"/>
+              </a:ext>
+            </a:extLst>
+          </p:cNvPr>
+          <p:cNvSpPr>
+            <a:spLocks noGrp="1"/>
+          </p:cNvSpPr>
+          <p:nvPr>
+            <p:ph type="title"/>
+          </p:nvPr>
+        </p:nvSpPr>
+        <p:spPr>
+          <a:xfrm>
+            <a:off x="680319" y="753230"/>
+            <a:ext cx="9617778" cy="951284"/>
+          </a:xfrm>
+        </p:spPr>
+        <p:txBody>
+          <a:bodyPr/>
+          <a:lstStyle/>
+          <a:p>
+            <a:r>
+              <a:rPr lang="en-US" dirty="0">
+                <a:latin typeface="Gabriola" panose="04040605051002020D02" pitchFamily="82" charset="0"/>
+              </a:rPr>
+              <a:t>Difficulties</a:t>
+            </a:r>
+          </a:p>
+        </p:txBody>
+      </p:sp>
+      <p:pic>
+        <p:nvPicPr>
+          <p:cNvPr id="7" name="Content Placeholder 5">
+            <a:extLst>
+              <a:ext uri="{FF2B5EF4-FFF2-40B4-BE49-F238E27FC236}">
+                <a16:creationId xmlns:a16="http://schemas.microsoft.com/office/drawing/2014/main" id="{59C37FEF-48A1-4EAF-81A4-37164A5B00E6}"/>
+              </a:ext>
+            </a:extLst>
+          </p:cNvPr>
+          <p:cNvPicPr>
+            <a:picLocks noGrp="1" noChangeAspect="1"/>
+          </p:cNvPicPr>
+          <p:nvPr>
+            <p:ph sz="half" idx="2"/>
+          </p:nvPr>
+        </p:nvPicPr>
+        <p:blipFill>
+          <a:blip r:embed="rId2"/>
+          <a:stretch>
+            <a:fillRect/>
+          </a:stretch>
+        </p:blipFill>
+        <p:spPr>
+          <a:xfrm>
+            <a:off x="595699" y="2513718"/>
+            <a:ext cx="4131024" cy="3934220"/>
+          </a:xfrm>
+          <a:prstGeom prst="rect">
+            <a:avLst/>
+          </a:prstGeom>
+        </p:spPr>
+      </p:pic>
+      <p:pic>
+        <p:nvPicPr>
+          <p:cNvPr id="8" name="Content Placeholder 7">
+            <a:extLst>
+              <a:ext uri="{FF2B5EF4-FFF2-40B4-BE49-F238E27FC236}">
+                <a16:creationId xmlns:a16="http://schemas.microsoft.com/office/drawing/2014/main" id="{E2750B25-FD9C-489A-ADB8-4A184725D3B8}"/>
+              </a:ext>
+            </a:extLst>
+          </p:cNvPr>
+          <p:cNvPicPr>
+            <a:picLocks noGrp="1" noChangeAspect="1"/>
+          </p:cNvPicPr>
+          <p:nvPr>
+            <p:ph sz="quarter" idx="4"/>
+          </p:nvPr>
+        </p:nvPicPr>
+        <p:blipFill>
+          <a:blip r:embed="rId3"/>
+          <a:stretch>
+            <a:fillRect/>
+          </a:stretch>
+        </p:blipFill>
+        <p:spPr>
+          <a:xfrm>
+            <a:off x="5416570" y="2513719"/>
+            <a:ext cx="6259630" cy="3934219"/>
+          </a:xfrm>
+          <a:prstGeom prst="rect">
+            <a:avLst/>
+          </a:prstGeom>
+        </p:spPr>
+      </p:pic>
+      <p:pic>
+        <p:nvPicPr>
+          <p:cNvPr id="9" name="Picture 8">
+            <a:extLst>
+              <a:ext uri="{FF2B5EF4-FFF2-40B4-BE49-F238E27FC236}">
+                <a16:creationId xmlns:a16="http://schemas.microsoft.com/office/drawing/2014/main" id="{A19086F9-B86A-4E87-A404-EABBC2C60236}"/>
+              </a:ext>
+            </a:extLst>
+          </p:cNvPr>
+          <p:cNvPicPr>
+            <a:picLocks noChangeAspect="1"/>
+          </p:cNvPicPr>
+          <p:nvPr/>
+        </p:nvPicPr>
+        <p:blipFill>
+          <a:blip r:embed="rId4"/>
+          <a:stretch>
+            <a:fillRect/>
+          </a:stretch>
+        </p:blipFill>
+        <p:spPr>
+          <a:xfrm>
+            <a:off x="10776627" y="753230"/>
+            <a:ext cx="1278656" cy="1090619"/>
+          </a:xfrm>
+          <a:prstGeom prst="rect">
+            <a:avLst/>
+          </a:prstGeom>
+        </p:spPr>
+      </p:pic>
+    </p:spTree>
+    <p:extLst>
+      <p:ext uri="{BB962C8B-B14F-4D97-AF65-F5344CB8AC3E}">
+        <p14:creationId xmlns:p14="http://schemas.microsoft.com/office/powerpoint/2010/main" val="3397598834"/>
+      </p:ext>
+    </p:extLst>
+  </p:cSld>
+  <p:clrMapOvr>
+    <a:masterClrMapping/>
+  </p:clrMapOvr>
+</p:sld>
+</file>
+
+<file path=ppt/slides/slide11.xml><?xml version="1.0" encoding="utf-8"?>
+<p:sld xmlns:a="http://schemas.openxmlformats.org/drawingml/2006/main" xmlns:r="http://schemas.openxmlformats.org/officeDocument/2006/relationships" xmlns:p="http://schemas.openxmlformats.org/presentationml/2006/main">
+  <p:cSld>
+    <p:spTree>
+      <p:nvGrpSpPr>
+        <p:cNvPr id="1" name=""/>
+        <p:cNvGrpSpPr/>
+        <p:nvPr/>
+      </p:nvGrpSpPr>
+      <p:grpSpPr>
+        <a:xfrm>
+          <a:off x="0" y="0"/>
+          <a:ext cx="0" cy="0"/>
+          <a:chOff x="0" y="0"/>
+          <a:chExt cx="0" cy="0"/>
+        </a:xfrm>
+      </p:grpSpPr>
+      <p:sp>
+        <p:nvSpPr>
+          <p:cNvPr id="2" name="Title 1">
+            <a:extLst>
+              <a:ext uri="{FF2B5EF4-FFF2-40B4-BE49-F238E27FC236}">
+                <a16:creationId xmlns:a16="http://schemas.microsoft.com/office/drawing/2014/main" id="{A573A4AF-39B5-419F-8AD8-9020C0D68039}"/>
+              </a:ext>
+            </a:extLst>
+          </p:cNvPr>
+          <p:cNvSpPr>
+            <a:spLocks noGrp="1"/>
+          </p:cNvSpPr>
+          <p:nvPr>
+            <p:ph type="title"/>
+          </p:nvPr>
+        </p:nvSpPr>
+        <p:spPr>
+          <a:xfrm>
+            <a:off x="680319" y="753230"/>
+            <a:ext cx="9617778" cy="951284"/>
+          </a:xfrm>
+        </p:spPr>
+        <p:txBody>
+          <a:bodyPr/>
+          <a:lstStyle/>
+          <a:p>
+            <a:r>
+              <a:rPr lang="en-US" dirty="0">
+                <a:latin typeface="Gabriola" panose="04040605051002020D02" pitchFamily="82" charset="0"/>
+              </a:rPr>
+              <a:t>Difficulties</a:t>
+            </a:r>
+          </a:p>
+        </p:txBody>
+      </p:sp>
+      <p:pic>
+        <p:nvPicPr>
+          <p:cNvPr id="9" name="Picture 8">
+            <a:extLst>
+              <a:ext uri="{FF2B5EF4-FFF2-40B4-BE49-F238E27FC236}">
+                <a16:creationId xmlns:a16="http://schemas.microsoft.com/office/drawing/2014/main" id="{A19086F9-B86A-4E87-A404-EABBC2C60236}"/>
+              </a:ext>
+            </a:extLst>
+          </p:cNvPr>
+          <p:cNvPicPr>
+            <a:picLocks noChangeAspect="1"/>
+          </p:cNvPicPr>
+          <p:nvPr/>
+        </p:nvPicPr>
+        <p:blipFill>
+          <a:blip r:embed="rId2"/>
+          <a:stretch>
+            <a:fillRect/>
+          </a:stretch>
+        </p:blipFill>
+        <p:spPr>
+          <a:xfrm>
+            <a:off x="10776627" y="753230"/>
+            <a:ext cx="1278656" cy="1090619"/>
+          </a:xfrm>
+          <a:prstGeom prst="rect">
+            <a:avLst/>
+          </a:prstGeom>
+        </p:spPr>
+      </p:pic>
+      <p:sp>
+        <p:nvSpPr>
+          <p:cNvPr id="4" name="Content Placeholder 3">
+            <a:extLst>
+              <a:ext uri="{FF2B5EF4-FFF2-40B4-BE49-F238E27FC236}">
+                <a16:creationId xmlns:a16="http://schemas.microsoft.com/office/drawing/2014/main" id="{0AF680B8-10DE-4CC5-88D9-5AB24E8BA1B5}"/>
+              </a:ext>
+            </a:extLst>
+          </p:cNvPr>
+          <p:cNvSpPr>
+            <a:spLocks noGrp="1"/>
+          </p:cNvSpPr>
+          <p:nvPr>
+            <p:ph sz="half" idx="2"/>
+          </p:nvPr>
+        </p:nvSpPr>
+        <p:spPr>
+          <a:xfrm>
+            <a:off x="180502" y="2382308"/>
+            <a:ext cx="11640023" cy="4094692"/>
+          </a:xfrm>
+        </p:spPr>
+        <p:txBody>
+          <a:bodyPr>
+            <a:normAutofit fontScale="92500" lnSpcReduction="20000"/>
+          </a:bodyPr>
+          <a:lstStyle/>
+          <a:p>
+            <a:r>
+              <a:rPr lang="en-US" b="1" u="sng" dirty="0"/>
+              <a:t>Yelp API:</a:t>
+            </a:r>
+          </a:p>
+          <a:p>
+            <a:pPr marL="0" indent="0">
+              <a:buNone/>
+            </a:pPr>
+            <a:endParaRPr lang="en-US" dirty="0"/>
+          </a:p>
+          <a:p>
+            <a:pPr marL="0" indent="0">
+              <a:buNone/>
+            </a:pPr>
+            <a:r>
+              <a:rPr lang="en-US" dirty="0"/>
+              <a:t>We were planning to tap the Yelp API through </a:t>
+            </a:r>
+            <a:r>
+              <a:rPr lang="en-US" dirty="0" err="1"/>
+              <a:t>Javascript</a:t>
+            </a:r>
+            <a:r>
+              <a:rPr lang="en-US" dirty="0"/>
+              <a:t> directly and faced authorization issues. However, after lots of R&amp;D and with Rob’s help </a:t>
+            </a:r>
+            <a:r>
+              <a:rPr lang="en-US" dirty="0">
+                <a:sym typeface="Wingdings" panose="05000000000000000000" pitchFamily="2" charset="2"/>
+              </a:rPr>
+              <a:t></a:t>
+            </a:r>
+            <a:r>
+              <a:rPr lang="en-US" dirty="0"/>
+              <a:t>, we got to know that Yelp does not allow clients to invoke the APIs through a frontend platform like </a:t>
+            </a:r>
+            <a:r>
+              <a:rPr lang="en-US" dirty="0" err="1"/>
+              <a:t>Javascript</a:t>
+            </a:r>
+            <a:r>
+              <a:rPr lang="en-US" dirty="0"/>
+              <a:t>. We then pivoted to call the API through backend (Python)</a:t>
+            </a:r>
+          </a:p>
+          <a:p>
+            <a:pPr marL="0" indent="0">
+              <a:buNone/>
+            </a:pPr>
+            <a:r>
+              <a:rPr lang="en-US" dirty="0"/>
+              <a:t>Reference: </a:t>
+            </a:r>
+            <a:r>
+              <a:rPr lang="en-US" dirty="0">
+                <a:hlinkClick r:id="rId3"/>
+              </a:rPr>
+              <a:t>https://github.com/Yelp/yelp-fusion/issues/386</a:t>
+            </a:r>
+            <a:endParaRPr lang="en-US" dirty="0"/>
+          </a:p>
+          <a:p>
+            <a:pPr marL="0" indent="0">
+              <a:buNone/>
+            </a:pPr>
+            <a:endParaRPr lang="en-US" dirty="0"/>
+          </a:p>
+          <a:p>
+            <a:r>
+              <a:rPr lang="en-US" b="1" u="sng" dirty="0"/>
+              <a:t>Web Page Navigations:</a:t>
+            </a:r>
+          </a:p>
+          <a:p>
+            <a:pPr marL="0" indent="0">
+              <a:buNone/>
+            </a:pPr>
+            <a:r>
+              <a:rPr lang="en-US" dirty="0"/>
+              <a:t>As the entire application is hosted on flask, we could not navigate between different html pages just by providing &lt;</a:t>
+            </a:r>
+            <a:r>
+              <a:rPr lang="en-US" dirty="0" err="1"/>
+              <a:t>href</a:t>
+            </a:r>
+            <a:r>
+              <a:rPr lang="en-US" dirty="0"/>
+              <a:t>&gt; attribute to the navigation items. We identified later that each &lt;</a:t>
+            </a:r>
+            <a:r>
+              <a:rPr lang="en-US" dirty="0" err="1"/>
+              <a:t>href</a:t>
+            </a:r>
+            <a:r>
+              <a:rPr lang="en-US" dirty="0"/>
+              <a:t>&gt; would need to be added as an app route in the python file which would then render that html.</a:t>
+            </a:r>
+          </a:p>
+          <a:p>
+            <a:endParaRPr lang="en-US" b="1" dirty="0"/>
+          </a:p>
+          <a:p>
+            <a:endParaRPr lang="en-US" b="1" dirty="0"/>
+          </a:p>
+        </p:txBody>
+      </p:sp>
+    </p:spTree>
+    <p:extLst>
+      <p:ext uri="{BB962C8B-B14F-4D97-AF65-F5344CB8AC3E}">
+        <p14:creationId xmlns:p14="http://schemas.microsoft.com/office/powerpoint/2010/main" val="3525689437"/>
+      </p:ext>
+    </p:extLst>
+  </p:cSld>
+  <p:clrMapOvr>
+    <a:masterClrMapping/>
+  </p:clrMapOvr>
+</p:sld>
+</file>
+
+<file path=ppt/slides/slide12.xml><?xml version="1.0" encoding="utf-8"?>
+<p:sld xmlns:a="http://schemas.openxmlformats.org/drawingml/2006/main" xmlns:r="http://schemas.openxmlformats.org/officeDocument/2006/relationships" xmlns:p="http://schemas.openxmlformats.org/presentationml/2006/main">
+  <p:cSld>
+    <p:spTree>
+      <p:nvGrpSpPr>
+        <p:cNvPr id="1" name=""/>
+        <p:cNvGrpSpPr/>
+        <p:nvPr/>
+      </p:nvGrpSpPr>
+      <p:grpSpPr>
+        <a:xfrm>
+          <a:off x="0" y="0"/>
+          <a:ext cx="0" cy="0"/>
+          <a:chOff x="0" y="0"/>
+          <a:chExt cx="0" cy="0"/>
+        </a:xfrm>
+      </p:grpSpPr>
+      <p:sp>
+        <p:nvSpPr>
+          <p:cNvPr id="2" name="Title 1">
+            <a:extLst>
+              <a:ext uri="{FF2B5EF4-FFF2-40B4-BE49-F238E27FC236}">
                 <a16:creationId xmlns:a16="http://schemas.microsoft.com/office/drawing/2014/main" id="{B9C1D1F9-D413-4D34-916E-692E74862FE8}"/>
               </a:ext>
             </a:extLst>
@@ -8397,9 +8788,59 @@
                 </a:solidFill>
                 <a:latin typeface="Cambria" panose="02040503050406030204" pitchFamily="18" charset="0"/>
                 <a:ea typeface="Cambria" panose="02040503050406030204" pitchFamily="18" charset="0"/>
+                <a:hlinkClick r:id="rId9"/>
               </a:rPr>
               <a:t>https://www.worldatlas.com/articles/top-coffee-producing-countries.html</a:t>
             </a:r>
+            <a:endParaRPr lang="en-US" sz="1600" dirty="0">
+              <a:solidFill>
+                <a:srgbClr val="FFC000"/>
+              </a:solidFill>
+              <a:latin typeface="Cambria" panose="02040503050406030204" pitchFamily="18" charset="0"/>
+              <a:ea typeface="Cambria" panose="02040503050406030204" pitchFamily="18" charset="0"/>
+            </a:endParaRPr>
+          </a:p>
+          <a:p>
+            <a:pPr lvl="0"/>
+            <a:r>
+              <a:rPr lang="en-US" sz="1600" dirty="0">
+                <a:solidFill>
+                  <a:srgbClr val="FFC000"/>
+                </a:solidFill>
+                <a:latin typeface="Cambria" panose="02040503050406030204" pitchFamily="18" charset="0"/>
+                <a:ea typeface="Cambria" panose="02040503050406030204" pitchFamily="18" charset="0"/>
+                <a:hlinkClick r:id="rId10"/>
+              </a:rPr>
+              <a:t>https://www.yelp.com/developers/documentation/v3/business_search</a:t>
+            </a:r>
+            <a:endParaRPr lang="en-US" sz="1600" dirty="0">
+              <a:solidFill>
+                <a:srgbClr val="FFC000"/>
+              </a:solidFill>
+              <a:latin typeface="Cambria" panose="02040503050406030204" pitchFamily="18" charset="0"/>
+              <a:ea typeface="Cambria" panose="02040503050406030204" pitchFamily="18" charset="0"/>
+            </a:endParaRPr>
+          </a:p>
+          <a:p>
+            <a:pPr lvl="0"/>
+            <a:r>
+              <a:rPr lang="en-US" sz="1600" dirty="0">
+                <a:solidFill>
+                  <a:srgbClr val="FFC000"/>
+                </a:solidFill>
+                <a:latin typeface="Cambria" panose="02040503050406030204" pitchFamily="18" charset="0"/>
+                <a:ea typeface="Cambria" panose="02040503050406030204" pitchFamily="18" charset="0"/>
+                <a:hlinkClick r:id="rId11"/>
+              </a:rPr>
+              <a:t>https://developer.twitter.com/en/docs/tweets/search/api-reference/get-search-tweets.html</a:t>
+            </a:r>
+            <a:endParaRPr lang="en-US" sz="1600" dirty="0">
+              <a:solidFill>
+                <a:srgbClr val="FFC000"/>
+              </a:solidFill>
+              <a:latin typeface="Cambria" panose="02040503050406030204" pitchFamily="18" charset="0"/>
+              <a:ea typeface="Cambria" panose="02040503050406030204" pitchFamily="18" charset="0"/>
+            </a:endParaRPr>
           </a:p>
           <a:p>
             <a:pPr lvl="0"/>
@@ -8412,7 +8853,9 @@
             </a:endParaRPr>
           </a:p>
           <a:p>
-            <a:pPr lvl="0"/>
+            <a:pPr marL="0" lvl="0" indent="0">
+              <a:buNone/>
+            </a:pPr>
             <a:endParaRPr lang="en-US" sz="1600" dirty="0">
               <a:solidFill>
                 <a:srgbClr val="FFC000"/>
@@ -8445,7 +8888,7 @@
           <p:nvPr/>
         </p:nvPicPr>
         <p:blipFill>
-          <a:blip r:embed="rId9"/>
+          <a:blip r:embed="rId12"/>
           <a:stretch>
             <a:fillRect/>
           </a:stretch>
@@ -8473,7 +8916,7 @@
 </p:sld>
 </file>
 
-<file path=ppt/slides/slide11.xml><?xml version="1.0" encoding="utf-8"?>
+<file path=ppt/slides/slide13.xml><?xml version="1.0" encoding="utf-8"?>
 <p:sld xmlns:a="http://schemas.openxmlformats.org/drawingml/2006/main" xmlns:r="http://schemas.openxmlformats.org/officeDocument/2006/relationships" xmlns:p="http://schemas.openxmlformats.org/presentationml/2006/main">
   <p:cSld>
     <p:bg>
@@ -9041,7 +9484,9 @@
         </p:nvSpPr>
         <p:spPr/>
         <p:txBody>
-          <a:bodyPr/>
+          <a:bodyPr>
+            <a:normAutofit lnSpcReduction="10000"/>
+          </a:bodyPr>
           <a:lstStyle/>
           <a:p>
             <a:pPr marL="0" indent="0">
@@ -9109,18 +9554,14 @@
                 <a:latin typeface="Cambria" panose="02040503050406030204" pitchFamily="18" charset="0"/>
                 <a:ea typeface="Cambria" panose="02040503050406030204" pitchFamily="18" charset="0"/>
               </a:rPr>
-              <a:t>Using YELP API, </a:t>
-            </a:r>
-            <a:r>
-              <a:rPr lang="en-US" dirty="0" err="1">
-                <a:solidFill>
-                  <a:srgbClr val="FFC000"/>
-                </a:solidFill>
-                <a:latin typeface="Cambria" panose="02040503050406030204" pitchFamily="18" charset="0"/>
-                <a:ea typeface="Cambria" panose="02040503050406030204" pitchFamily="18" charset="0"/>
-              </a:rPr>
-              <a:t>Tweepy</a:t>
-            </a:r>
+              <a:t>Using YELP API to find coffee places nearby and allow users to sort by rating, review count and distance. Also plotting the fetched places on the map and providing yelp page link for more details.</a:t>
+            </a:r>
+          </a:p>
+          <a:p>
+            <a:pPr marL="457200" indent="-457200">
+              <a:buFont typeface="+mj-lt"/>
+              <a:buAutoNum type="arabicPeriod"/>
+            </a:pPr>
             <a:r>
               <a:rPr lang="en-US" dirty="0">
                 <a:solidFill>
@@ -9129,7 +9570,7 @@
                 <a:latin typeface="Cambria" panose="02040503050406030204" pitchFamily="18" charset="0"/>
                 <a:ea typeface="Cambria" panose="02040503050406030204" pitchFamily="18" charset="0"/>
               </a:rPr>
-              <a:t> to collect data from customers input of their interests from around the world      </a:t>
+              <a:t>Using Twitter API to find latest tweets related to coffee</a:t>
             </a:r>
           </a:p>
           <a:p>
@@ -9616,39 +10057,25 @@
             <p:ph type="title"/>
           </p:nvPr>
         </p:nvSpPr>
-        <p:spPr/>
+        <p:spPr>
+          <a:xfrm>
+            <a:off x="680321" y="753228"/>
+            <a:ext cx="9613861" cy="1080938"/>
+          </a:xfrm>
+        </p:spPr>
         <p:txBody>
           <a:bodyPr/>
           <a:lstStyle/>
           <a:p>
+            <a:r>
+              <a:rPr lang="en-US">
+                <a:latin typeface="Gabriola" panose="04040605051002020D02" pitchFamily="82" charset="0"/>
+              </a:rPr>
+              <a:t>FindMyCoffee (Yelp API)</a:t>
+            </a:r>
             <a:endParaRPr lang="en-US" dirty="0">
               <a:latin typeface="Gabriola" panose="04040605051002020D02" pitchFamily="82" charset="0"/>
             </a:endParaRPr>
-          </a:p>
-        </p:txBody>
-      </p:sp>
-      <p:sp>
-        <p:nvSpPr>
-          <p:cNvPr id="3" name="Content Placeholder 2">
-            <a:extLst>
-              <a:ext uri="{FF2B5EF4-FFF2-40B4-BE49-F238E27FC236}">
-                <a16:creationId xmlns:a16="http://schemas.microsoft.com/office/drawing/2014/main" id="{5E10AFE8-2AC0-4111-AA46-6799AB6D4550}"/>
-              </a:ext>
-            </a:extLst>
-          </p:cNvPr>
-          <p:cNvSpPr>
-            <a:spLocks noGrp="1"/>
-          </p:cNvSpPr>
-          <p:nvPr>
-            <p:ph idx="1"/>
-          </p:nvPr>
-        </p:nvSpPr>
-        <p:spPr/>
-        <p:txBody>
-          <a:bodyPr/>
-          <a:lstStyle/>
-          <a:p>
-            <a:endParaRPr lang="en-US"/>
           </a:p>
         </p:txBody>
       </p:sp>
@@ -9676,6 +10103,36 @@
           <a:xfrm>
             <a:off x="10734675" y="826911"/>
             <a:ext cx="1323975" cy="933572"/>
+          </a:xfrm>
+          <a:prstGeom prst="rect">
+            <a:avLst/>
+          </a:prstGeom>
+        </p:spPr>
+      </p:pic>
+      <p:pic>
+        <p:nvPicPr>
+          <p:cNvPr id="5" name="Picture 4" descr="A screenshot of a cell phone&#10;&#10;Description generated with high confidence">
+            <a:extLst>
+              <a:ext uri="{FF2B5EF4-FFF2-40B4-BE49-F238E27FC236}">
+                <a16:creationId xmlns:a16="http://schemas.microsoft.com/office/drawing/2014/main" id="{B3A6D9F5-DAE5-499B-A8E8-A7976FE9FBC6}"/>
+              </a:ext>
+            </a:extLst>
+          </p:cNvPr>
+          <p:cNvPicPr>
+            <a:picLocks noChangeAspect="1"/>
+          </p:cNvPicPr>
+          <p:nvPr/>
+        </p:nvPicPr>
+        <p:blipFill>
+          <a:blip r:embed="rId3"/>
+          <a:stretch>
+            <a:fillRect/>
+          </a:stretch>
+        </p:blipFill>
+        <p:spPr>
+          <a:xfrm>
+            <a:off x="680321" y="2103120"/>
+            <a:ext cx="10170159" cy="4584699"/>
           </a:xfrm>
           <a:prstGeom prst="rect">
             <a:avLst/>
@@ -9717,7 +10174,7 @@
           <p:cNvPr id="2" name="Title 1">
             <a:extLst>
               <a:ext uri="{FF2B5EF4-FFF2-40B4-BE49-F238E27FC236}">
-                <a16:creationId xmlns:a16="http://schemas.microsoft.com/office/drawing/2014/main" id="{18BD31EE-4846-4F25-9BBB-7C882A1F3E36}"/>
+                <a16:creationId xmlns:a16="http://schemas.microsoft.com/office/drawing/2014/main" id="{AF9A6D61-B3F9-42DB-A604-67D4A5F85E3C}"/>
               </a:ext>
             </a:extLst>
           </p:cNvPr>
@@ -9728,347 +10185,37 @@
             <p:ph type="title"/>
           </p:nvPr>
         </p:nvSpPr>
-        <p:spPr/>
+        <p:spPr>
+          <a:xfrm>
+            <a:off x="680321" y="753228"/>
+            <a:ext cx="9613861" cy="1080938"/>
+          </a:xfrm>
+        </p:spPr>
         <p:txBody>
           <a:bodyPr/>
           <a:lstStyle/>
           <a:p>
+            <a:r>
+              <a:rPr lang="en-US" dirty="0" err="1">
+                <a:latin typeface="Gabriola" panose="04040605051002020D02" pitchFamily="82" charset="0"/>
+              </a:rPr>
+              <a:t>TweetBoard</a:t>
+            </a:r>
             <a:r>
               <a:rPr lang="en-US" dirty="0">
                 <a:latin typeface="Gabriola" panose="04040605051002020D02" pitchFamily="82" charset="0"/>
               </a:rPr>
-              <a:t>Data handling challenges</a:t>
-            </a:r>
-          </a:p>
-        </p:txBody>
-      </p:sp>
-      <p:sp>
-        <p:nvSpPr>
-          <p:cNvPr id="3" name="Content Placeholder 2">
+              <a:t> (Twitter API)</a:t>
+            </a:r>
+          </a:p>
+        </p:txBody>
+      </p:sp>
+      <p:pic>
+        <p:nvPicPr>
+          <p:cNvPr id="4" name="Picture 3">
             <a:extLst>
               <a:ext uri="{FF2B5EF4-FFF2-40B4-BE49-F238E27FC236}">
-                <a16:creationId xmlns:a16="http://schemas.microsoft.com/office/drawing/2014/main" id="{A37767CC-00F7-4108-9CDF-7E1DFD91F6B6}"/>
-              </a:ext>
-            </a:extLst>
-          </p:cNvPr>
-          <p:cNvSpPr>
-            <a:spLocks noGrp="1"/>
-          </p:cNvSpPr>
-          <p:nvPr>
-            <p:ph sz="half" idx="1"/>
-          </p:nvPr>
-        </p:nvSpPr>
-        <p:spPr>
-          <a:ln>
-            <a:solidFill>
-              <a:schemeClr val="accent1">
-                <a:lumMod val="60000"/>
-                <a:lumOff val="40000"/>
-              </a:schemeClr>
-            </a:solidFill>
-          </a:ln>
-        </p:spPr>
-        <p:txBody>
-          <a:bodyPr>
-            <a:normAutofit fontScale="85000" lnSpcReduction="20000"/>
-          </a:bodyPr>
-          <a:lstStyle/>
-          <a:p>
-            <a:r>
-              <a:rPr lang="en-US" sz="1600" dirty="0">
-                <a:solidFill>
-                  <a:srgbClr val="FFC000"/>
-                </a:solidFill>
-                <a:latin typeface="Cambria" panose="02040503050406030204" pitchFamily="18" charset="0"/>
-                <a:ea typeface="Cambria" panose="02040503050406030204" pitchFamily="18" charset="0"/>
-              </a:rPr>
-              <a:t> {</a:t>
-            </a:r>
-          </a:p>
-          <a:p>
-            <a:r>
-              <a:rPr lang="en-US" sz="1600" dirty="0">
-                <a:solidFill>
-                  <a:srgbClr val="FFC000"/>
-                </a:solidFill>
-                <a:latin typeface="Cambria" panose="02040503050406030204" pitchFamily="18" charset="0"/>
-                <a:ea typeface="Cambria" panose="02040503050406030204" pitchFamily="18" charset="0"/>
-              </a:rPr>
-              <a:t>    "type": "Feature",</a:t>
-            </a:r>
-          </a:p>
-          <a:p>
-            <a:r>
-              <a:rPr lang="en-US" sz="1600" dirty="0">
-                <a:solidFill>
-                  <a:srgbClr val="FFC000"/>
-                </a:solidFill>
-                <a:latin typeface="Cambria" panose="02040503050406030204" pitchFamily="18" charset="0"/>
-                <a:ea typeface="Cambria" panose="02040503050406030204" pitchFamily="18" charset="0"/>
-              </a:rPr>
-              <a:t>    "geometry": {</a:t>
-            </a:r>
-          </a:p>
-          <a:p>
-            <a:r>
-              <a:rPr lang="en-US" sz="1600" dirty="0">
-                <a:solidFill>
-                  <a:srgbClr val="FFC000"/>
-                </a:solidFill>
-                <a:latin typeface="Cambria" panose="02040503050406030204" pitchFamily="18" charset="0"/>
-                <a:ea typeface="Cambria" panose="02040503050406030204" pitchFamily="18" charset="0"/>
-              </a:rPr>
-              <a:t>       "type": "Point",</a:t>
-            </a:r>
-          </a:p>
-          <a:p>
-            <a:r>
-              <a:rPr lang="en-US" sz="1600" dirty="0">
-                <a:solidFill>
-                  <a:srgbClr val="FFC000"/>
-                </a:solidFill>
-                <a:latin typeface="Cambria" panose="02040503050406030204" pitchFamily="18" charset="0"/>
-                <a:ea typeface="Cambria" panose="02040503050406030204" pitchFamily="18" charset="0"/>
-              </a:rPr>
-              <a:t>       "coordinates":  [ -74.297333,4.570868 ]</a:t>
-            </a:r>
-          </a:p>
-          <a:p>
-            <a:r>
-              <a:rPr lang="en-US" sz="1600" dirty="0">
-                <a:solidFill>
-                  <a:srgbClr val="FFC000"/>
-                </a:solidFill>
-                <a:latin typeface="Cambria" panose="02040503050406030204" pitchFamily="18" charset="0"/>
-                <a:ea typeface="Cambria" panose="02040503050406030204" pitchFamily="18" charset="0"/>
-              </a:rPr>
-              <a:t>    },</a:t>
-            </a:r>
-          </a:p>
-          <a:p>
-            <a:r>
-              <a:rPr lang="en-US" sz="1600" dirty="0">
-                <a:solidFill>
-                  <a:srgbClr val="FFC000"/>
-                </a:solidFill>
-                <a:latin typeface="Cambria" panose="02040503050406030204" pitchFamily="18" charset="0"/>
-                <a:ea typeface="Cambria" panose="02040503050406030204" pitchFamily="18" charset="0"/>
-              </a:rPr>
-              <a:t>    "properties": {</a:t>
-            </a:r>
-          </a:p>
-          <a:p>
-            <a:r>
-              <a:rPr lang="en-US" sz="1600" dirty="0">
-                <a:solidFill>
-                  <a:srgbClr val="FFC000"/>
-                </a:solidFill>
-                <a:latin typeface="Cambria" panose="02040503050406030204" pitchFamily="18" charset="0"/>
-                <a:ea typeface="Cambria" panose="02040503050406030204" pitchFamily="18" charset="0"/>
-              </a:rPr>
-              <a:t>    "rank":3,</a:t>
-            </a:r>
-          </a:p>
-          <a:p>
-            <a:r>
-              <a:rPr lang="en-US" sz="1600" dirty="0">
-                <a:solidFill>
-                  <a:srgbClr val="FFC000"/>
-                </a:solidFill>
-                <a:latin typeface="Cambria" panose="02040503050406030204" pitchFamily="18" charset="0"/>
-                <a:ea typeface="Cambria" panose="02040503050406030204" pitchFamily="18" charset="0"/>
-              </a:rPr>
-              <a:t>    "country":"Colombia",</a:t>
-            </a:r>
-          </a:p>
-          <a:p>
-            <a:r>
-              <a:rPr lang="en-US" sz="1600" dirty="0">
-                <a:solidFill>
-                  <a:srgbClr val="FFC000"/>
-                </a:solidFill>
-                <a:latin typeface="Cambria" panose="02040503050406030204" pitchFamily="18" charset="0"/>
-                <a:ea typeface="Cambria" panose="02040503050406030204" pitchFamily="18" charset="0"/>
-              </a:rPr>
-              <a:t>    "production":14634,</a:t>
-            </a:r>
-          </a:p>
-          <a:p>
-            <a:r>
-              <a:rPr lang="en-US" sz="1600" dirty="0">
-                <a:solidFill>
-                  <a:srgbClr val="FFC000"/>
-                </a:solidFill>
-                <a:latin typeface="Cambria" panose="02040503050406030204" pitchFamily="18" charset="0"/>
-                <a:ea typeface="Cambria" panose="02040503050406030204" pitchFamily="18" charset="0"/>
-              </a:rPr>
-              <a:t>    "export":12898</a:t>
-            </a:r>
-          </a:p>
-          <a:p>
-            <a:r>
-              <a:rPr lang="en-US" sz="1600" dirty="0">
-                <a:solidFill>
-                  <a:srgbClr val="FFC000"/>
-                </a:solidFill>
-                <a:latin typeface="Cambria" panose="02040503050406030204" pitchFamily="18" charset="0"/>
-                <a:ea typeface="Cambria" panose="02040503050406030204" pitchFamily="18" charset="0"/>
-              </a:rPr>
-              <a:t>    }</a:t>
-            </a:r>
-          </a:p>
-          <a:p>
-            <a:r>
-              <a:rPr lang="en-US" sz="1600" dirty="0">
-                <a:solidFill>
-                  <a:srgbClr val="FFC000"/>
-                </a:solidFill>
-                <a:latin typeface="Cambria" panose="02040503050406030204" pitchFamily="18" charset="0"/>
-                <a:ea typeface="Cambria" panose="02040503050406030204" pitchFamily="18" charset="0"/>
-              </a:rPr>
-              <a:t>  },</a:t>
-            </a:r>
-          </a:p>
-        </p:txBody>
-      </p:sp>
-      <p:sp>
-        <p:nvSpPr>
-          <p:cNvPr id="4" name="Content Placeholder 3">
-            <a:extLst>
-              <a:ext uri="{FF2B5EF4-FFF2-40B4-BE49-F238E27FC236}">
-                <a16:creationId xmlns:a16="http://schemas.microsoft.com/office/drawing/2014/main" id="{377B37DB-B4B1-4EA0-A5D8-E6AF2D48E321}"/>
-              </a:ext>
-            </a:extLst>
-          </p:cNvPr>
-          <p:cNvSpPr>
-            <a:spLocks noGrp="1"/>
-          </p:cNvSpPr>
-          <p:nvPr>
-            <p:ph sz="half" idx="2"/>
-          </p:nvPr>
-        </p:nvSpPr>
-        <p:spPr>
-          <a:ln>
-            <a:solidFill>
-              <a:schemeClr val="accent1">
-                <a:lumMod val="60000"/>
-                <a:lumOff val="40000"/>
-              </a:schemeClr>
-            </a:solidFill>
-          </a:ln>
-        </p:spPr>
-        <p:txBody>
-          <a:bodyPr>
-            <a:normAutofit fontScale="85000" lnSpcReduction="20000"/>
-          </a:bodyPr>
-          <a:lstStyle/>
-          <a:p>
-            <a:r>
-              <a:rPr lang="en-US" sz="1600" dirty="0">
-                <a:solidFill>
-                  <a:srgbClr val="FFC000"/>
-                </a:solidFill>
-                <a:latin typeface="Cambria" panose="02040503050406030204" pitchFamily="18" charset="0"/>
-                <a:ea typeface="Cambria" panose="02040503050406030204" pitchFamily="18" charset="0"/>
-              </a:rPr>
-              <a:t>{</a:t>
-            </a:r>
-          </a:p>
-          <a:p>
-            <a:r>
-              <a:rPr lang="en-US" sz="1600" dirty="0">
-                <a:solidFill>
-                  <a:srgbClr val="FFC000"/>
-                </a:solidFill>
-                <a:latin typeface="Cambria" panose="02040503050406030204" pitchFamily="18" charset="0"/>
-                <a:ea typeface="Cambria" panose="02040503050406030204" pitchFamily="18" charset="0"/>
-              </a:rPr>
-              <a:t>    "rank":3,</a:t>
-            </a:r>
-          </a:p>
-          <a:p>
-            <a:r>
-              <a:rPr lang="en-US" sz="1600" dirty="0">
-                <a:solidFill>
-                  <a:srgbClr val="FFC000"/>
-                </a:solidFill>
-                <a:latin typeface="Cambria" panose="02040503050406030204" pitchFamily="18" charset="0"/>
-                <a:ea typeface="Cambria" panose="02040503050406030204" pitchFamily="18" charset="0"/>
-              </a:rPr>
-              <a:t>    "country":"Colombia",</a:t>
-            </a:r>
-          </a:p>
-          <a:p>
-            <a:r>
-              <a:rPr lang="en-US" sz="1600" dirty="0">
-                <a:solidFill>
-                  <a:srgbClr val="FFC000"/>
-                </a:solidFill>
-                <a:latin typeface="Cambria" panose="02040503050406030204" pitchFamily="18" charset="0"/>
-                <a:ea typeface="Cambria" panose="02040503050406030204" pitchFamily="18" charset="0"/>
-              </a:rPr>
-              <a:t>    "coordinates":  [ 4.570868,-74.297333 ],</a:t>
-            </a:r>
-          </a:p>
-          <a:p>
-            <a:r>
-              <a:rPr lang="en-US" sz="1600" dirty="0">
-                <a:solidFill>
-                  <a:srgbClr val="FFC000"/>
-                </a:solidFill>
-                <a:latin typeface="Cambria" panose="02040503050406030204" pitchFamily="18" charset="0"/>
-                <a:ea typeface="Cambria" panose="02040503050406030204" pitchFamily="18" charset="0"/>
-              </a:rPr>
-              <a:t>    "production":14634,</a:t>
-            </a:r>
-          </a:p>
-          <a:p>
-            <a:r>
-              <a:rPr lang="en-US" sz="1600" dirty="0">
-                <a:solidFill>
-                  <a:srgbClr val="FFC000"/>
-                </a:solidFill>
-                <a:latin typeface="Cambria" panose="02040503050406030204" pitchFamily="18" charset="0"/>
-                <a:ea typeface="Cambria" panose="02040503050406030204" pitchFamily="18" charset="0"/>
-              </a:rPr>
-              <a:t>    "export":12898,</a:t>
-            </a:r>
-          </a:p>
-          <a:p>
-            <a:r>
-              <a:rPr lang="en-US" sz="1600" dirty="0">
-                <a:solidFill>
-                  <a:srgbClr val="FFC000"/>
-                </a:solidFill>
-                <a:latin typeface="Cambria" panose="02040503050406030204" pitchFamily="18" charset="0"/>
-                <a:ea typeface="Cambria" panose="02040503050406030204" pitchFamily="18" charset="0"/>
-              </a:rPr>
-              <a:t>    "radSize":20</a:t>
-            </a:r>
-          </a:p>
-          <a:p>
-            <a:r>
-              <a:rPr lang="en-US" sz="1600" dirty="0">
-                <a:solidFill>
-                  <a:srgbClr val="FFC000"/>
-                </a:solidFill>
-                <a:latin typeface="Cambria" panose="02040503050406030204" pitchFamily="18" charset="0"/>
-                <a:ea typeface="Cambria" panose="02040503050406030204" pitchFamily="18" charset="0"/>
-              </a:rPr>
-              <a:t>  },</a:t>
-            </a:r>
-          </a:p>
-          <a:p>
-            <a:endParaRPr lang="en-US" dirty="0"/>
-          </a:p>
-        </p:txBody>
-      </p:sp>
-      <p:pic>
-        <p:nvPicPr>
-          <p:cNvPr id="5" name="Picture 4">
-            <a:extLst>
-              <a:ext uri="{FF2B5EF4-FFF2-40B4-BE49-F238E27FC236}">
-                <a16:creationId xmlns:a16="http://schemas.microsoft.com/office/drawing/2014/main" id="{33B7385E-4438-4F30-9082-B8FC751199BC}"/>
+                <a16:creationId xmlns:a16="http://schemas.microsoft.com/office/drawing/2014/main" id="{AED17088-867C-4E4E-8D45-CA6E59C79CDB}"/>
               </a:ext>
             </a:extLst>
           </p:cNvPr>
@@ -10085,8 +10232,38 @@
         </p:blipFill>
         <p:spPr>
           <a:xfrm>
-            <a:off x="10715209" y="867893"/>
-            <a:ext cx="1370320" cy="801110"/>
+            <a:off x="10734675" y="826911"/>
+            <a:ext cx="1323975" cy="933572"/>
+          </a:xfrm>
+          <a:prstGeom prst="rect">
+            <a:avLst/>
+          </a:prstGeom>
+        </p:spPr>
+      </p:pic>
+      <p:pic>
+        <p:nvPicPr>
+          <p:cNvPr id="3" name="Picture 2">
+            <a:extLst>
+              <a:ext uri="{FF2B5EF4-FFF2-40B4-BE49-F238E27FC236}">
+                <a16:creationId xmlns:a16="http://schemas.microsoft.com/office/drawing/2014/main" id="{39AB57A6-7FC5-465C-AFCA-F364FF60FC7B}"/>
+              </a:ext>
+            </a:extLst>
+          </p:cNvPr>
+          <p:cNvPicPr>
+            <a:picLocks noChangeAspect="1"/>
+          </p:cNvPicPr>
+          <p:nvPr/>
+        </p:nvPicPr>
+        <p:blipFill>
+          <a:blip r:embed="rId3"/>
+          <a:stretch>
+            <a:fillRect/>
+          </a:stretch>
+        </p:blipFill>
+        <p:spPr>
+          <a:xfrm>
+            <a:off x="904240" y="2153920"/>
+            <a:ext cx="10170160" cy="4554220"/>
           </a:xfrm>
           <a:prstGeom prst="rect">
             <a:avLst/>
@@ -10096,7 +10273,7 @@
     </p:spTree>
     <p:extLst>
       <p:ext uri="{BB962C8B-B14F-4D97-AF65-F5344CB8AC3E}">
-        <p14:creationId xmlns:p14="http://schemas.microsoft.com/office/powerpoint/2010/main" val="2344671379"/>
+        <p14:creationId xmlns:p14="http://schemas.microsoft.com/office/powerpoint/2010/main" val="2741295768"/>
       </p:ext>
     </p:extLst>
   </p:cSld>
@@ -10128,7 +10305,7 @@
           <p:cNvPr id="2" name="Title 1">
             <a:extLst>
               <a:ext uri="{FF2B5EF4-FFF2-40B4-BE49-F238E27FC236}">
-                <a16:creationId xmlns:a16="http://schemas.microsoft.com/office/drawing/2014/main" id="{A573A4AF-39B5-419F-8AD8-9020C0D68039}"/>
+                <a16:creationId xmlns:a16="http://schemas.microsoft.com/office/drawing/2014/main" id="{18BD31EE-4846-4F25-9BBB-7C882A1F3E36}"/>
               </a:ext>
             </a:extLst>
           </p:cNvPr>
@@ -10139,12 +10316,7 @@
             <p:ph type="title"/>
           </p:nvPr>
         </p:nvSpPr>
-        <p:spPr>
-          <a:xfrm>
-            <a:off x="680319" y="753230"/>
-            <a:ext cx="9617778" cy="951284"/>
-          </a:xfrm>
-        </p:spPr>
+        <p:spPr/>
         <p:txBody>
           <a:bodyPr/>
           <a:lstStyle/>
@@ -10153,81 +10325,338 @@
               <a:rPr lang="en-US" dirty="0">
                 <a:latin typeface="Gabriola" panose="04040605051002020D02" pitchFamily="82" charset="0"/>
               </a:rPr>
-              <a:t>Difficulties</a:t>
-            </a:r>
-          </a:p>
-        </p:txBody>
-      </p:sp>
-      <p:pic>
-        <p:nvPicPr>
-          <p:cNvPr id="7" name="Content Placeholder 5">
+              <a:t>Data handling challenges</a:t>
+            </a:r>
+          </a:p>
+        </p:txBody>
+      </p:sp>
+      <p:sp>
+        <p:nvSpPr>
+          <p:cNvPr id="3" name="Content Placeholder 2">
             <a:extLst>
               <a:ext uri="{FF2B5EF4-FFF2-40B4-BE49-F238E27FC236}">
-                <a16:creationId xmlns:a16="http://schemas.microsoft.com/office/drawing/2014/main" id="{59C37FEF-48A1-4EAF-81A4-37164A5B00E6}"/>
+                <a16:creationId xmlns:a16="http://schemas.microsoft.com/office/drawing/2014/main" id="{A37767CC-00F7-4108-9CDF-7E1DFD91F6B6}"/>
               </a:ext>
             </a:extLst>
           </p:cNvPr>
-          <p:cNvPicPr>
-            <a:picLocks noGrp="1" noChangeAspect="1"/>
-          </p:cNvPicPr>
-          <p:nvPr>
-            <p:ph sz="half" idx="2"/>
-          </p:nvPr>
-        </p:nvPicPr>
-        <p:blipFill>
-          <a:blip r:embed="rId2"/>
-          <a:stretch>
-            <a:fillRect/>
-          </a:stretch>
-        </p:blipFill>
-        <p:spPr>
-          <a:xfrm>
-            <a:off x="595699" y="2513718"/>
-            <a:ext cx="4131024" cy="3934220"/>
-          </a:xfrm>
-          <a:prstGeom prst="rect">
-            <a:avLst/>
-          </a:prstGeom>
-        </p:spPr>
-      </p:pic>
-      <p:pic>
-        <p:nvPicPr>
-          <p:cNvPr id="8" name="Content Placeholder 7">
+          <p:cNvSpPr>
+            <a:spLocks noGrp="1"/>
+          </p:cNvSpPr>
+          <p:nvPr>
+            <p:ph sz="half" idx="1"/>
+          </p:nvPr>
+        </p:nvSpPr>
+        <p:spPr>
+          <a:ln>
+            <a:solidFill>
+              <a:schemeClr val="accent1">
+                <a:lumMod val="60000"/>
+                <a:lumOff val="40000"/>
+              </a:schemeClr>
+            </a:solidFill>
+          </a:ln>
+        </p:spPr>
+        <p:txBody>
+          <a:bodyPr>
+            <a:normAutofit fontScale="85000" lnSpcReduction="20000"/>
+          </a:bodyPr>
+          <a:lstStyle/>
+          <a:p>
+            <a:r>
+              <a:rPr lang="en-US" sz="1600" dirty="0">
+                <a:solidFill>
+                  <a:srgbClr val="FFC000"/>
+                </a:solidFill>
+                <a:latin typeface="Cambria" panose="02040503050406030204" pitchFamily="18" charset="0"/>
+                <a:ea typeface="Cambria" panose="02040503050406030204" pitchFamily="18" charset="0"/>
+              </a:rPr>
+              <a:t> {</a:t>
+            </a:r>
+          </a:p>
+          <a:p>
+            <a:r>
+              <a:rPr lang="en-US" sz="1600" dirty="0">
+                <a:solidFill>
+                  <a:srgbClr val="FFC000"/>
+                </a:solidFill>
+                <a:latin typeface="Cambria" panose="02040503050406030204" pitchFamily="18" charset="0"/>
+                <a:ea typeface="Cambria" panose="02040503050406030204" pitchFamily="18" charset="0"/>
+              </a:rPr>
+              <a:t>    "type": "Feature",</a:t>
+            </a:r>
+          </a:p>
+          <a:p>
+            <a:r>
+              <a:rPr lang="en-US" sz="1600" dirty="0">
+                <a:solidFill>
+                  <a:srgbClr val="FFC000"/>
+                </a:solidFill>
+                <a:latin typeface="Cambria" panose="02040503050406030204" pitchFamily="18" charset="0"/>
+                <a:ea typeface="Cambria" panose="02040503050406030204" pitchFamily="18" charset="0"/>
+              </a:rPr>
+              <a:t>    "geometry": {</a:t>
+            </a:r>
+          </a:p>
+          <a:p>
+            <a:r>
+              <a:rPr lang="en-US" sz="1600" dirty="0">
+                <a:solidFill>
+                  <a:srgbClr val="FFC000"/>
+                </a:solidFill>
+                <a:latin typeface="Cambria" panose="02040503050406030204" pitchFamily="18" charset="0"/>
+                <a:ea typeface="Cambria" panose="02040503050406030204" pitchFamily="18" charset="0"/>
+              </a:rPr>
+              <a:t>       "type": "Point",</a:t>
+            </a:r>
+          </a:p>
+          <a:p>
+            <a:r>
+              <a:rPr lang="en-US" sz="1600" dirty="0">
+                <a:solidFill>
+                  <a:srgbClr val="FFC000"/>
+                </a:solidFill>
+                <a:latin typeface="Cambria" panose="02040503050406030204" pitchFamily="18" charset="0"/>
+                <a:ea typeface="Cambria" panose="02040503050406030204" pitchFamily="18" charset="0"/>
+              </a:rPr>
+              <a:t>       "coordinates":  [ -74.297333,4.570868 ]</a:t>
+            </a:r>
+          </a:p>
+          <a:p>
+            <a:r>
+              <a:rPr lang="en-US" sz="1600" dirty="0">
+                <a:solidFill>
+                  <a:srgbClr val="FFC000"/>
+                </a:solidFill>
+                <a:latin typeface="Cambria" panose="02040503050406030204" pitchFamily="18" charset="0"/>
+                <a:ea typeface="Cambria" panose="02040503050406030204" pitchFamily="18" charset="0"/>
+              </a:rPr>
+              <a:t>    },</a:t>
+            </a:r>
+          </a:p>
+          <a:p>
+            <a:r>
+              <a:rPr lang="en-US" sz="1600" dirty="0">
+                <a:solidFill>
+                  <a:srgbClr val="FFC000"/>
+                </a:solidFill>
+                <a:latin typeface="Cambria" panose="02040503050406030204" pitchFamily="18" charset="0"/>
+                <a:ea typeface="Cambria" panose="02040503050406030204" pitchFamily="18" charset="0"/>
+              </a:rPr>
+              <a:t>    "properties": {</a:t>
+            </a:r>
+          </a:p>
+          <a:p>
+            <a:r>
+              <a:rPr lang="en-US" sz="1600" dirty="0">
+                <a:solidFill>
+                  <a:srgbClr val="FFC000"/>
+                </a:solidFill>
+                <a:latin typeface="Cambria" panose="02040503050406030204" pitchFamily="18" charset="0"/>
+                <a:ea typeface="Cambria" panose="02040503050406030204" pitchFamily="18" charset="0"/>
+              </a:rPr>
+              <a:t>    "rank":3,</a:t>
+            </a:r>
+          </a:p>
+          <a:p>
+            <a:r>
+              <a:rPr lang="en-US" sz="1600" dirty="0">
+                <a:solidFill>
+                  <a:srgbClr val="FFC000"/>
+                </a:solidFill>
+                <a:latin typeface="Cambria" panose="02040503050406030204" pitchFamily="18" charset="0"/>
+                <a:ea typeface="Cambria" panose="02040503050406030204" pitchFamily="18" charset="0"/>
+              </a:rPr>
+              <a:t>    "country":"Colombia",</a:t>
+            </a:r>
+          </a:p>
+          <a:p>
+            <a:r>
+              <a:rPr lang="en-US" sz="1600" dirty="0">
+                <a:solidFill>
+                  <a:srgbClr val="FFC000"/>
+                </a:solidFill>
+                <a:latin typeface="Cambria" panose="02040503050406030204" pitchFamily="18" charset="0"/>
+                <a:ea typeface="Cambria" panose="02040503050406030204" pitchFamily="18" charset="0"/>
+              </a:rPr>
+              <a:t>    "production":14634,</a:t>
+            </a:r>
+          </a:p>
+          <a:p>
+            <a:r>
+              <a:rPr lang="en-US" sz="1600" dirty="0">
+                <a:solidFill>
+                  <a:srgbClr val="FFC000"/>
+                </a:solidFill>
+                <a:latin typeface="Cambria" panose="02040503050406030204" pitchFamily="18" charset="0"/>
+                <a:ea typeface="Cambria" panose="02040503050406030204" pitchFamily="18" charset="0"/>
+              </a:rPr>
+              <a:t>    "export":12898</a:t>
+            </a:r>
+          </a:p>
+          <a:p>
+            <a:r>
+              <a:rPr lang="en-US" sz="1600" dirty="0">
+                <a:solidFill>
+                  <a:srgbClr val="FFC000"/>
+                </a:solidFill>
+                <a:latin typeface="Cambria" panose="02040503050406030204" pitchFamily="18" charset="0"/>
+                <a:ea typeface="Cambria" panose="02040503050406030204" pitchFamily="18" charset="0"/>
+              </a:rPr>
+              <a:t>    }</a:t>
+            </a:r>
+          </a:p>
+          <a:p>
+            <a:r>
+              <a:rPr lang="en-US" sz="1600" dirty="0">
+                <a:solidFill>
+                  <a:srgbClr val="FFC000"/>
+                </a:solidFill>
+                <a:latin typeface="Cambria" panose="02040503050406030204" pitchFamily="18" charset="0"/>
+                <a:ea typeface="Cambria" panose="02040503050406030204" pitchFamily="18" charset="0"/>
+              </a:rPr>
+              <a:t>  },</a:t>
+            </a:r>
+          </a:p>
+        </p:txBody>
+      </p:sp>
+      <p:sp>
+        <p:nvSpPr>
+          <p:cNvPr id="4" name="Content Placeholder 3">
             <a:extLst>
               <a:ext uri="{FF2B5EF4-FFF2-40B4-BE49-F238E27FC236}">
-                <a16:creationId xmlns:a16="http://schemas.microsoft.com/office/drawing/2014/main" id="{E2750B25-FD9C-489A-ADB8-4A184725D3B8}"/>
+                <a16:creationId xmlns:a16="http://schemas.microsoft.com/office/drawing/2014/main" id="{377B37DB-B4B1-4EA0-A5D8-E6AF2D48E321}"/>
               </a:ext>
             </a:extLst>
           </p:cNvPr>
-          <p:cNvPicPr>
-            <a:picLocks noGrp="1" noChangeAspect="1"/>
-          </p:cNvPicPr>
-          <p:nvPr>
-            <p:ph sz="quarter" idx="4"/>
-          </p:nvPr>
-        </p:nvPicPr>
-        <p:blipFill>
-          <a:blip r:embed="rId3"/>
-          <a:stretch>
-            <a:fillRect/>
-          </a:stretch>
-        </p:blipFill>
-        <p:spPr>
-          <a:xfrm>
-            <a:off x="5416570" y="2513719"/>
-            <a:ext cx="6259630" cy="3934219"/>
-          </a:xfrm>
-          <a:prstGeom prst="rect">
-            <a:avLst/>
-          </a:prstGeom>
-        </p:spPr>
-      </p:pic>
+          <p:cNvSpPr>
+            <a:spLocks noGrp="1"/>
+          </p:cNvSpPr>
+          <p:nvPr>
+            <p:ph sz="half" idx="2"/>
+          </p:nvPr>
+        </p:nvSpPr>
+        <p:spPr>
+          <a:ln>
+            <a:solidFill>
+              <a:schemeClr val="accent1">
+                <a:lumMod val="60000"/>
+                <a:lumOff val="40000"/>
+              </a:schemeClr>
+            </a:solidFill>
+          </a:ln>
+        </p:spPr>
+        <p:txBody>
+          <a:bodyPr>
+            <a:normAutofit fontScale="85000" lnSpcReduction="20000"/>
+          </a:bodyPr>
+          <a:lstStyle/>
+          <a:p>
+            <a:r>
+              <a:rPr lang="en-US" sz="1600" dirty="0">
+                <a:solidFill>
+                  <a:srgbClr val="FFC000"/>
+                </a:solidFill>
+                <a:latin typeface="Cambria" panose="02040503050406030204" pitchFamily="18" charset="0"/>
+                <a:ea typeface="Cambria" panose="02040503050406030204" pitchFamily="18" charset="0"/>
+              </a:rPr>
+              <a:t>{</a:t>
+            </a:r>
+          </a:p>
+          <a:p>
+            <a:r>
+              <a:rPr lang="en-US" sz="1600" dirty="0">
+                <a:solidFill>
+                  <a:srgbClr val="FFC000"/>
+                </a:solidFill>
+                <a:latin typeface="Cambria" panose="02040503050406030204" pitchFamily="18" charset="0"/>
+                <a:ea typeface="Cambria" panose="02040503050406030204" pitchFamily="18" charset="0"/>
+              </a:rPr>
+              <a:t>    "rank":3,</a:t>
+            </a:r>
+          </a:p>
+          <a:p>
+            <a:r>
+              <a:rPr lang="en-US" sz="1600" dirty="0">
+                <a:solidFill>
+                  <a:srgbClr val="FFC000"/>
+                </a:solidFill>
+                <a:latin typeface="Cambria" panose="02040503050406030204" pitchFamily="18" charset="0"/>
+                <a:ea typeface="Cambria" panose="02040503050406030204" pitchFamily="18" charset="0"/>
+              </a:rPr>
+              <a:t>    "country":"Colombia",</a:t>
+            </a:r>
+          </a:p>
+          <a:p>
+            <a:r>
+              <a:rPr lang="en-US" sz="1600" dirty="0">
+                <a:solidFill>
+                  <a:srgbClr val="FFC000"/>
+                </a:solidFill>
+                <a:latin typeface="Cambria" panose="02040503050406030204" pitchFamily="18" charset="0"/>
+                <a:ea typeface="Cambria" panose="02040503050406030204" pitchFamily="18" charset="0"/>
+              </a:rPr>
+              <a:t>    "coordinates":  [ 4.570868,-74.297333 ],</a:t>
+            </a:r>
+          </a:p>
+          <a:p>
+            <a:r>
+              <a:rPr lang="en-US" sz="1600" dirty="0">
+                <a:solidFill>
+                  <a:srgbClr val="FFC000"/>
+                </a:solidFill>
+                <a:latin typeface="Cambria" panose="02040503050406030204" pitchFamily="18" charset="0"/>
+                <a:ea typeface="Cambria" panose="02040503050406030204" pitchFamily="18" charset="0"/>
+              </a:rPr>
+              <a:t>    "production":14634,</a:t>
+            </a:r>
+          </a:p>
+          <a:p>
+            <a:r>
+              <a:rPr lang="en-US" sz="1600" dirty="0">
+                <a:solidFill>
+                  <a:srgbClr val="FFC000"/>
+                </a:solidFill>
+                <a:latin typeface="Cambria" panose="02040503050406030204" pitchFamily="18" charset="0"/>
+                <a:ea typeface="Cambria" panose="02040503050406030204" pitchFamily="18" charset="0"/>
+              </a:rPr>
+              <a:t>    "export":12898,</a:t>
+            </a:r>
+          </a:p>
+          <a:p>
+            <a:r>
+              <a:rPr lang="en-US" sz="1600" dirty="0">
+                <a:solidFill>
+                  <a:srgbClr val="FFC000"/>
+                </a:solidFill>
+                <a:latin typeface="Cambria" panose="02040503050406030204" pitchFamily="18" charset="0"/>
+                <a:ea typeface="Cambria" panose="02040503050406030204" pitchFamily="18" charset="0"/>
+              </a:rPr>
+              <a:t>    "radSize":20</a:t>
+            </a:r>
+          </a:p>
+          <a:p>
+            <a:r>
+              <a:rPr lang="en-US" sz="1600" dirty="0">
+                <a:solidFill>
+                  <a:srgbClr val="FFC000"/>
+                </a:solidFill>
+                <a:latin typeface="Cambria" panose="02040503050406030204" pitchFamily="18" charset="0"/>
+                <a:ea typeface="Cambria" panose="02040503050406030204" pitchFamily="18" charset="0"/>
+              </a:rPr>
+              <a:t>  },</a:t>
+            </a:r>
+          </a:p>
+          <a:p>
+            <a:endParaRPr lang="en-US" dirty="0"/>
+          </a:p>
+        </p:txBody>
+      </p:sp>
       <p:pic>
         <p:nvPicPr>
-          <p:cNvPr id="9" name="Picture 8">
+          <p:cNvPr id="5" name="Picture 4">
             <a:extLst>
               <a:ext uri="{FF2B5EF4-FFF2-40B4-BE49-F238E27FC236}">
-                <a16:creationId xmlns:a16="http://schemas.microsoft.com/office/drawing/2014/main" id="{A19086F9-B86A-4E87-A404-EABBC2C60236}"/>
+                <a16:creationId xmlns:a16="http://schemas.microsoft.com/office/drawing/2014/main" id="{33B7385E-4438-4F30-9082-B8FC751199BC}"/>
               </a:ext>
             </a:extLst>
           </p:cNvPr>
@@ -10237,15 +10666,15 @@
           <p:nvPr/>
         </p:nvPicPr>
         <p:blipFill>
-          <a:blip r:embed="rId4"/>
+          <a:blip r:embed="rId2"/>
           <a:stretch>
             <a:fillRect/>
           </a:stretch>
         </p:blipFill>
         <p:spPr>
           <a:xfrm>
-            <a:off x="10776627" y="753230"/>
-            <a:ext cx="1278656" cy="1090619"/>
+            <a:off x="10715209" y="867893"/>
+            <a:ext cx="1370320" cy="801110"/>
           </a:xfrm>
           <a:prstGeom prst="rect">
             <a:avLst/>
@@ -10255,7 +10684,7 @@
     </p:spTree>
     <p:extLst>
       <p:ext uri="{BB962C8B-B14F-4D97-AF65-F5344CB8AC3E}">
-        <p14:creationId xmlns:p14="http://schemas.microsoft.com/office/powerpoint/2010/main" val="3397598834"/>
+        <p14:creationId xmlns:p14="http://schemas.microsoft.com/office/powerpoint/2010/main" val="2344671379"/>
       </p:ext>
     </p:extLst>
   </p:cSld>

</xml_diff>

<commit_message>
Added data flow diagram to ppt
</commit_message>
<xml_diff>
--- a/Know Your Brew!.pptx
+++ b/Know Your Brew!.pptx
@@ -9838,34 +9838,12 @@
           <a:bodyPr/>
           <a:lstStyle/>
           <a:p>
-            <a:endParaRPr lang="en-US" dirty="0">
-              <a:latin typeface="Gabriola" panose="04040605051002020D02" pitchFamily="82" charset="0"/>
-            </a:endParaRPr>
-          </a:p>
-        </p:txBody>
-      </p:sp>
-      <p:sp>
-        <p:nvSpPr>
-          <p:cNvPr id="3" name="Content Placeholder 2">
-            <a:extLst>
-              <a:ext uri="{FF2B5EF4-FFF2-40B4-BE49-F238E27FC236}">
-                <a16:creationId xmlns:a16="http://schemas.microsoft.com/office/drawing/2014/main" id="{BC09ED15-9510-4453-A62F-84D4CA80F0B0}"/>
-              </a:ext>
-            </a:extLst>
-          </p:cNvPr>
-          <p:cNvSpPr>
-            <a:spLocks noGrp="1"/>
-          </p:cNvSpPr>
-          <p:nvPr>
-            <p:ph idx="1"/>
-          </p:nvPr>
-        </p:nvSpPr>
-        <p:spPr/>
-        <p:txBody>
-          <a:bodyPr/>
-          <a:lstStyle/>
-          <a:p>
-            <a:endParaRPr lang="en-US"/>
+            <a:r>
+              <a:rPr lang="en-US" dirty="0">
+                <a:latin typeface="Gabriola" panose="04040605051002020D02" pitchFamily="82" charset="0"/>
+              </a:rPr>
+              <a:t>Data Flow &amp; Architecture</a:t>
+            </a:r>
           </a:p>
         </p:txBody>
       </p:sp>
@@ -9893,6 +9871,36 @@
           <a:xfrm>
             <a:off x="10848513" y="879500"/>
             <a:ext cx="1128664" cy="857313"/>
+          </a:xfrm>
+          <a:prstGeom prst="rect">
+            <a:avLst/>
+          </a:prstGeom>
+        </p:spPr>
+      </p:pic>
+      <p:pic>
+        <p:nvPicPr>
+          <p:cNvPr id="6" name="Picture 5">
+            <a:extLst>
+              <a:ext uri="{FF2B5EF4-FFF2-40B4-BE49-F238E27FC236}">
+                <a16:creationId xmlns:a16="http://schemas.microsoft.com/office/drawing/2014/main" id="{C06ABB09-327B-4BD9-98F7-FCE61ABCB933}"/>
+              </a:ext>
+            </a:extLst>
+          </p:cNvPr>
+          <p:cNvPicPr>
+            <a:picLocks noChangeAspect="1"/>
+          </p:cNvPicPr>
+          <p:nvPr/>
+        </p:nvPicPr>
+        <p:blipFill>
+          <a:blip r:embed="rId3"/>
+          <a:stretch>
+            <a:fillRect/>
+          </a:stretch>
+        </p:blipFill>
+        <p:spPr>
+          <a:xfrm>
+            <a:off x="680321" y="2153919"/>
+            <a:ext cx="10404239" cy="4412615"/>
           </a:xfrm>
           <a:prstGeom prst="rect">
             <a:avLst/>

</xml_diff>